<commit_message>
Typos in the how-to-use
</commit_message>
<xml_diff>
--- a/how-to-use.pptx
+++ b/how-to-use.pptx
@@ -3214,7 +3214,7 @@
           <p:nvPr>
             <p:extLst>
               <p:ext uri="{D42A27DB-BD31-4B8C-83A1-F6EECF244321}">
-                <p14:modId xmlns:p14="http://schemas.microsoft.com/office/powerpoint/2010/main" val="1444148007"/>
+                <p14:modId xmlns:p14="http://schemas.microsoft.com/office/powerpoint/2010/main" val="3192712969"/>
               </p:ext>
             </p:extLst>
           </p:nvPr>
@@ -3374,7 +3374,7 @@
                     <a:p>
                       <a:r>
                         <a:rPr lang="en-US" dirty="0" smtClean="0"/>
-                        <a:t>K</a:t>
+                        <a:t>0</a:t>
                       </a:r>
                       <a:endParaRPr lang="en-US" dirty="0"/>
                     </a:p>
@@ -3419,7 +3419,7 @@
                     <a:p>
                       <a:r>
                         <a:rPr lang="en-US" dirty="0" smtClean="0"/>
-                        <a:t>0</a:t>
+                        <a:t>K</a:t>
                       </a:r>
                       <a:endParaRPr lang="en-US" dirty="0"/>
                     </a:p>
@@ -3842,7 +3842,7 @@
           <p:nvPr>
             <p:extLst>
               <p:ext uri="{D42A27DB-BD31-4B8C-83A1-F6EECF244321}">
-                <p14:modId xmlns:p14="http://schemas.microsoft.com/office/powerpoint/2010/main" val="234717393"/>
+                <p14:modId xmlns:p14="http://schemas.microsoft.com/office/powerpoint/2010/main" val="1165102892"/>
               </p:ext>
             </p:extLst>
           </p:nvPr>
@@ -4187,7 +4187,7 @@
                     <a:p>
                       <a:r>
                         <a:rPr lang="en-US" dirty="0" smtClean="0"/>
-                        <a:t>B</a:t>
+                        <a:t>B2</a:t>
                       </a:r>
                       <a:endParaRPr lang="en-US" dirty="0"/>
                     </a:p>
@@ -4469,8 +4469,8 @@
         </p:nvSpPr>
         <p:spPr>
           <a:xfrm>
-            <a:off x="215516" y="2612103"/>
-            <a:ext cx="576064" cy="594648"/>
+            <a:off x="251520" y="2749570"/>
+            <a:ext cx="576064" cy="409982"/>
           </a:xfrm>
           <a:prstGeom prst="rect">
             <a:avLst/>
@@ -4647,6 +4647,66 @@
               <a:rPr lang="en-US" dirty="0" smtClean="0"/>
               <a:t>Other element describe connection between two masses.</a:t>
             </a:r>
+          </a:p>
+        </p:txBody>
+      </p:sp>
+      <p:sp>
+        <p:nvSpPr>
+          <p:cNvPr id="2" name="TextBox 1"/>
+          <p:cNvSpPr txBox="1"/>
+          <p:nvPr/>
+        </p:nvSpPr>
+        <p:spPr>
+          <a:xfrm>
+            <a:off x="4174530" y="4509120"/>
+            <a:ext cx="1117550" cy="369332"/>
+          </a:xfrm>
+          <a:prstGeom prst="rect">
+            <a:avLst/>
+          </a:prstGeom>
+          <a:noFill/>
+        </p:spPr>
+        <p:txBody>
+          <a:bodyPr wrap="none" rtlCol="0">
+            <a:spAutoFit/>
+          </a:bodyPr>
+          <a:lstStyle/>
+          <a:p>
+            <a:r>
+              <a:rPr lang="en-US" dirty="0" smtClean="0"/>
+              <a:t>For spring</a:t>
+            </a:r>
+            <a:endParaRPr lang="en-US" dirty="0"/>
+          </a:p>
+        </p:txBody>
+      </p:sp>
+      <p:sp>
+        <p:nvSpPr>
+          <p:cNvPr id="23" name="TextBox 22"/>
+          <p:cNvSpPr txBox="1"/>
+          <p:nvPr/>
+        </p:nvSpPr>
+        <p:spPr>
+          <a:xfrm>
+            <a:off x="6905528" y="4538230"/>
+            <a:ext cx="1276247" cy="369332"/>
+          </a:xfrm>
+          <a:prstGeom prst="rect">
+            <a:avLst/>
+          </a:prstGeom>
+          <a:noFill/>
+        </p:spPr>
+        <p:txBody>
+          <a:bodyPr wrap="none" rtlCol="0">
+            <a:spAutoFit/>
+          </a:bodyPr>
+          <a:lstStyle/>
+          <a:p>
+            <a:r>
+              <a:rPr lang="en-US" dirty="0" smtClean="0"/>
+              <a:t>For damper</a:t>
+            </a:r>
+            <a:endParaRPr lang="en-US" dirty="0"/>
           </a:p>
         </p:txBody>
       </p:sp>

</xml_diff>